<commit_message>
added a graphic about SIR used in covid-19 report context
</commit_message>
<xml_diff>
--- a/TP1-PosterSNE-MODELO-SIR.pptx
+++ b/TP1-PosterSNE-MODELO-SIR.pptx
@@ -3473,8 +3473,8 @@
           <a:chExt cx="0" cy="0"/>
         </a:xfrm>
       </p:grpSpPr>
-      <mc:AlternateContent xmlns:mc="http://schemas.openxmlformats.org/markup-compatibility/2006" xmlns:a14="http://schemas.microsoft.com/office/drawing/2010/main">
-        <mc:Choice Requires="a14">
+      <mc:AlternateContent xmlns:mc="http://schemas.openxmlformats.org/markup-compatibility/2006">
+        <mc:Choice xmlns:a14="http://schemas.microsoft.com/office/drawing/2010/main" Requires="a14">
           <p:sp>
             <p:nvSpPr>
               <p:cNvPr id="15" name="CaixaDeTexto 14">
@@ -3491,7 +3491,7 @@
             </p:nvSpPr>
             <p:spPr>
               <a:xfrm>
-                <a:off x="27394" y="7994425"/>
+                <a:off x="10540" y="8047470"/>
                 <a:ext cx="7384901" cy="16619934"/>
               </a:xfrm>
               <a:prstGeom prst="rect">
@@ -3504,6 +3504,86 @@
                 <a:spAutoFit/>
               </a:bodyPr>
               <a:lstStyle/>
+              <a:p>
+                <a:pPr algn="just"/>
+                <a:endParaRPr lang="en-US" sz="2400" b="1" dirty="0">
+                  <a:solidFill>
+                    <a:srgbClr val="DD8D5C"/>
+                  </a:solidFill>
+                  <a:latin typeface="NewsGotT" pitchFamily="2" charset="0"/>
+                  <a:cs typeface="Times New Roman" panose="02020603050405020304" pitchFamily="18" charset="0"/>
+                </a:endParaRPr>
+              </a:p>
+              <a:p>
+                <a:pPr algn="just"/>
+                <a:endParaRPr lang="en-US" sz="2400" b="1" dirty="0">
+                  <a:solidFill>
+                    <a:srgbClr val="DD8D5C"/>
+                  </a:solidFill>
+                  <a:latin typeface="NewsGotT" pitchFamily="2" charset="0"/>
+                  <a:cs typeface="Times New Roman" panose="02020603050405020304" pitchFamily="18" charset="0"/>
+                </a:endParaRPr>
+              </a:p>
+              <a:p>
+                <a:pPr algn="just"/>
+                <a:endParaRPr lang="en-US" sz="2400" b="1" dirty="0">
+                  <a:solidFill>
+                    <a:srgbClr val="DD8D5C"/>
+                  </a:solidFill>
+                  <a:latin typeface="NewsGotT" pitchFamily="2" charset="0"/>
+                  <a:cs typeface="Times New Roman" panose="02020603050405020304" pitchFamily="18" charset="0"/>
+                </a:endParaRPr>
+              </a:p>
+              <a:p>
+                <a:pPr algn="just"/>
+                <a:endParaRPr lang="en-US" sz="2400" b="1" dirty="0">
+                  <a:solidFill>
+                    <a:srgbClr val="DD8D5C"/>
+                  </a:solidFill>
+                  <a:latin typeface="NewsGotT" pitchFamily="2" charset="0"/>
+                  <a:cs typeface="Times New Roman" panose="02020603050405020304" pitchFamily="18" charset="0"/>
+                </a:endParaRPr>
+              </a:p>
+              <a:p>
+                <a:pPr algn="just"/>
+                <a:endParaRPr lang="en-US" sz="2400" b="1" dirty="0">
+                  <a:solidFill>
+                    <a:srgbClr val="DD8D5C"/>
+                  </a:solidFill>
+                  <a:latin typeface="NewsGotT" pitchFamily="2" charset="0"/>
+                  <a:cs typeface="Times New Roman" panose="02020603050405020304" pitchFamily="18" charset="0"/>
+                </a:endParaRPr>
+              </a:p>
+              <a:p>
+                <a:pPr algn="just"/>
+                <a:endParaRPr lang="en-US" sz="2400" b="1" dirty="0">
+                  <a:solidFill>
+                    <a:srgbClr val="DD8D5C"/>
+                  </a:solidFill>
+                  <a:latin typeface="NewsGotT" pitchFamily="2" charset="0"/>
+                  <a:cs typeface="Times New Roman" panose="02020603050405020304" pitchFamily="18" charset="0"/>
+                </a:endParaRPr>
+              </a:p>
+              <a:p>
+                <a:pPr algn="just"/>
+                <a:endParaRPr lang="en-US" sz="2400" b="1" dirty="0">
+                  <a:solidFill>
+                    <a:srgbClr val="DD8D5C"/>
+                  </a:solidFill>
+                  <a:latin typeface="NewsGotT" pitchFamily="2" charset="0"/>
+                  <a:cs typeface="Times New Roman" panose="02020603050405020304" pitchFamily="18" charset="0"/>
+                </a:endParaRPr>
+              </a:p>
+              <a:p>
+                <a:pPr algn="just"/>
+                <a:endParaRPr lang="en-US" sz="2400" b="1" dirty="0">
+                  <a:solidFill>
+                    <a:srgbClr val="DD8D5C"/>
+                  </a:solidFill>
+                  <a:latin typeface="NewsGotT" pitchFamily="2" charset="0"/>
+                  <a:cs typeface="Times New Roman" panose="02020603050405020304" pitchFamily="18" charset="0"/>
+                </a:endParaRPr>
+              </a:p>
               <a:p>
                 <a:pPr algn="just"/>
                 <a:r>
@@ -4555,19 +4635,6 @@
                 </a:r>
               </a:p>
               <a:p>
-                <a:pPr algn="just">
-                  <a:buFont typeface="Arial" panose="020B0604020202020204" pitchFamily="34" charset="0"/>
-                  <a:buChar char="•"/>
-                </a:pPr>
-                <a:endParaRPr lang="en-US" sz="1800" dirty="0">
-                  <a:solidFill>
-                    <a:srgbClr val="2A3648"/>
-                  </a:solidFill>
-                  <a:latin typeface="NewsGotT" pitchFamily="2" charset="0"/>
-                  <a:cs typeface="Times New Roman" panose="02020603050405020304" pitchFamily="18" charset="0"/>
-                </a:endParaRPr>
-              </a:p>
-              <a:p>
                 <a:pPr algn="just"/>
                 <a:r>
                   <a:rPr lang="en-US" sz="2400" b="1" dirty="0" err="1">
@@ -4996,19 +5063,6 @@
                   </a:rPr>
                   <a:t> - Número de indivíduos na população</a:t>
                 </a:r>
-              </a:p>
-              <a:p>
-                <a:pPr marL="285750" indent="-285750" algn="just">
-                  <a:buFont typeface="Arial" panose="020B0604020202020204" pitchFamily="34" charset="0"/>
-                  <a:buChar char="•"/>
-                </a:pPr>
-                <a:endParaRPr lang="pt-PT" sz="1800" dirty="0">
-                  <a:solidFill>
-                    <a:srgbClr val="2A3648"/>
-                  </a:solidFill>
-                  <a:latin typeface="NewsGotT" pitchFamily="2" charset="0"/>
-                  <a:cs typeface="Times New Roman" panose="02020603050405020304" pitchFamily="18" charset="0"/>
-                </a:endParaRPr>
               </a:p>
               <a:p>
                 <a:pPr algn="just"/>
@@ -5065,16 +5119,6 @@
               </a:p>
               <a:p>
                 <a:pPr algn="just"/>
-                <a:endParaRPr lang="pt-PT" sz="1800" dirty="0">
-                  <a:solidFill>
-                    <a:srgbClr val="2A3648"/>
-                  </a:solidFill>
-                  <a:latin typeface="NewsGotT" pitchFamily="2" charset="0"/>
-                  <a:cs typeface="Times New Roman" panose="02020603050405020304" pitchFamily="18" charset="0"/>
-                </a:endParaRPr>
-              </a:p>
-              <a:p>
-                <a:pPr algn="just"/>
                 <a:r>
                   <a:rPr lang="pt-PT" sz="1800" dirty="0">
                     <a:solidFill>
@@ -5085,74 +5129,6 @@
                   </a:rPr>
                   <a:t>O modelo SIR é descrito pelas seguintes equações:</a:t>
                 </a:r>
-              </a:p>
-              <a:p>
-                <a:pPr algn="just"/>
-                <a:endParaRPr lang="pt-PT" sz="1800" dirty="0">
-                  <a:solidFill>
-                    <a:srgbClr val="2A3648"/>
-                  </a:solidFill>
-                  <a:latin typeface="NewsGotT" pitchFamily="2" charset="0"/>
-                  <a:cs typeface="Times New Roman" panose="02020603050405020304" pitchFamily="18" charset="0"/>
-                </a:endParaRPr>
-              </a:p>
-              <a:p>
-                <a:pPr marL="285750" indent="-285750" algn="just">
-                  <a:buFont typeface="Arial" panose="020B0604020202020204" pitchFamily="34" charset="0"/>
-                  <a:buChar char="•"/>
-                </a:pPr>
-                <a:endParaRPr lang="en-US" sz="1800" dirty="0">
-                  <a:solidFill>
-                    <a:srgbClr val="2A3648"/>
-                  </a:solidFill>
-                  <a:latin typeface="NewsGotT" pitchFamily="2" charset="0"/>
-                  <a:cs typeface="Times New Roman" panose="02020603050405020304" pitchFamily="18" charset="0"/>
-                </a:endParaRPr>
-              </a:p>
-              <a:p>
-                <a:pPr algn="just">
-                  <a:buFont typeface="Arial" panose="020B0604020202020204" pitchFamily="34" charset="0"/>
-                  <a:buChar char="•"/>
-                </a:pPr>
-                <a:endParaRPr lang="en-US" sz="1800" dirty="0">
-                  <a:solidFill>
-                    <a:srgbClr val="2A3648"/>
-                  </a:solidFill>
-                  <a:latin typeface="NewsGotT" pitchFamily="2" charset="0"/>
-                  <a:cs typeface="Times New Roman" panose="02020603050405020304" pitchFamily="18" charset="0"/>
-                </a:endParaRPr>
-              </a:p>
-              <a:p>
-                <a:pPr algn="just">
-                  <a:buFont typeface="Arial" panose="020B0604020202020204" pitchFamily="34" charset="0"/>
-                  <a:buChar char="•"/>
-                </a:pPr>
-                <a:endParaRPr lang="en-US" sz="1800" dirty="0">
-                  <a:solidFill>
-                    <a:srgbClr val="2A3648"/>
-                  </a:solidFill>
-                  <a:latin typeface="NewsGotT" pitchFamily="2" charset="0"/>
-                  <a:cs typeface="Times New Roman" panose="02020603050405020304" pitchFamily="18" charset="0"/>
-                </a:endParaRPr>
-              </a:p>
-              <a:p>
-                <a:pPr algn="just">
-                  <a:buFont typeface="Arial" panose="020B0604020202020204" pitchFamily="34" charset="0"/>
-                  <a:buChar char="•"/>
-                </a:pPr>
-                <a:endParaRPr lang="en-US" sz="1800" dirty="0">
-                  <a:solidFill>
-                    <a:srgbClr val="2A3648"/>
-                  </a:solidFill>
-                  <a:latin typeface="NewsGotT" pitchFamily="2" charset="0"/>
-                  <a:cs typeface="Times New Roman" panose="02020603050405020304" pitchFamily="18" charset="0"/>
-                </a:endParaRPr>
-              </a:p>
-              <a:p>
-                <a:pPr algn="just">
-                  <a:buFont typeface="Arial" panose="020B0604020202020204" pitchFamily="34" charset="0"/>
-                  <a:buChar char="•"/>
-                </a:pPr>
                 <a:endParaRPr lang="en-US" sz="1800" dirty="0">
                   <a:solidFill>
                     <a:srgbClr val="2A3648"/>
@@ -5173,383 +5149,6 @@
               </a:p>
               <a:p>
                 <a:pPr algn="just"/>
-                <a:r>
-                  <a:rPr lang="en-US" sz="1800" dirty="0" err="1">
-                    <a:solidFill>
-                      <a:srgbClr val="2A3648"/>
-                    </a:solidFill>
-                    <a:latin typeface="NewsGotT" pitchFamily="2" charset="0"/>
-                    <a:cs typeface="Times New Roman" panose="02020603050405020304" pitchFamily="18" charset="0"/>
-                  </a:rPr>
-                  <a:t>Condições</a:t>
-                </a:r>
-                <a:r>
-                  <a:rPr lang="en-US" sz="1800" dirty="0">
-                    <a:solidFill>
-                      <a:srgbClr val="2A3648"/>
-                    </a:solidFill>
-                    <a:latin typeface="NewsGotT" pitchFamily="2" charset="0"/>
-                    <a:cs typeface="Times New Roman" panose="02020603050405020304" pitchFamily="18" charset="0"/>
-                  </a:rPr>
-                  <a:t> </a:t>
-                </a:r>
-                <a:r>
-                  <a:rPr lang="en-US" sz="1800" dirty="0" err="1">
-                    <a:solidFill>
-                      <a:srgbClr val="2A3648"/>
-                    </a:solidFill>
-                    <a:latin typeface="NewsGotT" pitchFamily="2" charset="0"/>
-                    <a:cs typeface="Times New Roman" panose="02020603050405020304" pitchFamily="18" charset="0"/>
-                  </a:rPr>
-                  <a:t>Iniciais</a:t>
-                </a:r>
-                <a:r>
-                  <a:rPr lang="en-US" sz="1800" dirty="0">
-                    <a:solidFill>
-                      <a:srgbClr val="2A3648"/>
-                    </a:solidFill>
-                    <a:latin typeface="NewsGotT" pitchFamily="2" charset="0"/>
-                    <a:cs typeface="Times New Roman" panose="02020603050405020304" pitchFamily="18" charset="0"/>
-                  </a:rPr>
-                  <a:t>: </a:t>
-                </a:r>
-              </a:p>
-              <a:p>
-                <a:pPr marL="285750" indent="-285750" algn="just">
-                  <a:buFont typeface="Arial" panose="020B0604020202020204" pitchFamily="34" charset="0"/>
-                  <a:buChar char="•"/>
-                </a:pPr>
-                <a:r>
-                  <a:rPr lang="en-US" sz="1800" b="1" dirty="0">
-                    <a:solidFill>
-                      <a:srgbClr val="2A3648"/>
-                    </a:solidFill>
-                    <a:latin typeface="NewsGotT" pitchFamily="2" charset="0"/>
-                    <a:cs typeface="Times New Roman" panose="02020603050405020304" pitchFamily="18" charset="0"/>
-                  </a:rPr>
-                  <a:t>S(0) = 1000 </a:t>
-                </a:r>
-                <a:r>
-                  <a:rPr lang="en-US" sz="1800" dirty="0">
-                    <a:solidFill>
-                      <a:srgbClr val="2A3648"/>
-                    </a:solidFill>
-                    <a:latin typeface="NewsGotT" pitchFamily="2" charset="0"/>
-                    <a:cs typeface="Times New Roman" panose="02020603050405020304" pitchFamily="18" charset="0"/>
-                  </a:rPr>
-                  <a:t>(</a:t>
-                </a:r>
-                <a:r>
-                  <a:rPr lang="en-US" sz="1800" dirty="0" err="1">
-                    <a:solidFill>
-                      <a:srgbClr val="2A3648"/>
-                    </a:solidFill>
-                    <a:latin typeface="NewsGotT" pitchFamily="2" charset="0"/>
-                    <a:cs typeface="Times New Roman" panose="02020603050405020304" pitchFamily="18" charset="0"/>
-                  </a:rPr>
-                  <a:t>indivíduos</a:t>
-                </a:r>
-                <a:r>
-                  <a:rPr lang="en-US" sz="1800" dirty="0">
-                    <a:solidFill>
-                      <a:srgbClr val="2A3648"/>
-                    </a:solidFill>
-                    <a:latin typeface="NewsGotT" pitchFamily="2" charset="0"/>
-                    <a:cs typeface="Times New Roman" panose="02020603050405020304" pitchFamily="18" charset="0"/>
-                  </a:rPr>
-                  <a:t> </a:t>
-                </a:r>
-                <a:r>
-                  <a:rPr lang="en-US" sz="1800" dirty="0" err="1">
-                    <a:solidFill>
-                      <a:srgbClr val="2A3648"/>
-                    </a:solidFill>
-                    <a:latin typeface="NewsGotT" pitchFamily="2" charset="0"/>
-                    <a:cs typeface="Times New Roman" panose="02020603050405020304" pitchFamily="18" charset="0"/>
-                  </a:rPr>
-                  <a:t>susceptíveis</a:t>
-                </a:r>
-                <a:r>
-                  <a:rPr lang="en-US" sz="1800" dirty="0">
-                    <a:solidFill>
-                      <a:srgbClr val="2A3648"/>
-                    </a:solidFill>
-                    <a:latin typeface="NewsGotT" pitchFamily="2" charset="0"/>
-                    <a:cs typeface="Times New Roman" panose="02020603050405020304" pitchFamily="18" charset="0"/>
-                  </a:rPr>
-                  <a:t>)</a:t>
-                </a:r>
-              </a:p>
-              <a:p>
-                <a:pPr marL="285750" indent="-285750" algn="just">
-                  <a:buFont typeface="Arial" panose="020B0604020202020204" pitchFamily="34" charset="0"/>
-                  <a:buChar char="•"/>
-                </a:pPr>
-                <a:r>
-                  <a:rPr lang="en-US" sz="1800" b="1" dirty="0">
-                    <a:solidFill>
-                      <a:srgbClr val="2A3648"/>
-                    </a:solidFill>
-                    <a:latin typeface="NewsGotT" pitchFamily="2" charset="0"/>
-                    <a:cs typeface="Times New Roman" panose="02020603050405020304" pitchFamily="18" charset="0"/>
-                  </a:rPr>
-                  <a:t>I(0) = 1     </a:t>
-                </a:r>
-                <a:r>
-                  <a:rPr lang="en-US" sz="1800" dirty="0">
-                    <a:solidFill>
-                      <a:srgbClr val="2A3648"/>
-                    </a:solidFill>
-                    <a:latin typeface="NewsGotT" pitchFamily="2" charset="0"/>
-                    <a:cs typeface="Times New Roman" panose="02020603050405020304" pitchFamily="18" charset="0"/>
-                  </a:rPr>
-                  <a:t>(</a:t>
-                </a:r>
-                <a:r>
-                  <a:rPr lang="en-US" sz="1800" dirty="0" err="1">
-                    <a:solidFill>
-                      <a:srgbClr val="2A3648"/>
-                    </a:solidFill>
-                    <a:latin typeface="NewsGotT" pitchFamily="2" charset="0"/>
-                    <a:cs typeface="Times New Roman" panose="02020603050405020304" pitchFamily="18" charset="0"/>
-                  </a:rPr>
-                  <a:t>indivíduo</a:t>
-                </a:r>
-                <a:r>
-                  <a:rPr lang="en-US" sz="1800" dirty="0">
-                    <a:solidFill>
-                      <a:srgbClr val="2A3648"/>
-                    </a:solidFill>
-                    <a:latin typeface="NewsGotT" pitchFamily="2" charset="0"/>
-                    <a:cs typeface="Times New Roman" panose="02020603050405020304" pitchFamily="18" charset="0"/>
-                  </a:rPr>
-                  <a:t> </a:t>
-                </a:r>
-                <a:r>
-                  <a:rPr lang="en-US" sz="1800" dirty="0" err="1">
-                    <a:solidFill>
-                      <a:srgbClr val="2A3648"/>
-                    </a:solidFill>
-                    <a:latin typeface="NewsGotT" pitchFamily="2" charset="0"/>
-                    <a:cs typeface="Times New Roman" panose="02020603050405020304" pitchFamily="18" charset="0"/>
-                  </a:rPr>
-                  <a:t>infetado</a:t>
-                </a:r>
-                <a:r>
-                  <a:rPr lang="en-US" sz="1800" dirty="0">
-                    <a:solidFill>
-                      <a:srgbClr val="2A3648"/>
-                    </a:solidFill>
-                    <a:latin typeface="NewsGotT" pitchFamily="2" charset="0"/>
-                    <a:cs typeface="Times New Roman" panose="02020603050405020304" pitchFamily="18" charset="0"/>
-                  </a:rPr>
-                  <a:t>)</a:t>
-                </a:r>
-              </a:p>
-              <a:p>
-                <a:pPr marL="285750" indent="-285750" algn="just">
-                  <a:buFont typeface="Arial" panose="020B0604020202020204" pitchFamily="34" charset="0"/>
-                  <a:buChar char="•"/>
-                </a:pPr>
-                <a:r>
-                  <a:rPr lang="en-US" sz="1800" b="1" dirty="0">
-                    <a:solidFill>
-                      <a:srgbClr val="2A3648"/>
-                    </a:solidFill>
-                    <a:latin typeface="NewsGotT" pitchFamily="2" charset="0"/>
-                    <a:cs typeface="Times New Roman" panose="02020603050405020304" pitchFamily="18" charset="0"/>
-                  </a:rPr>
-                  <a:t>R(0) = 0    </a:t>
-                </a:r>
-                <a:r>
-                  <a:rPr lang="en-US" sz="1800" dirty="0">
-                    <a:solidFill>
-                      <a:srgbClr val="2A3648"/>
-                    </a:solidFill>
-                    <a:latin typeface="NewsGotT" pitchFamily="2" charset="0"/>
-                    <a:cs typeface="Times New Roman" panose="02020603050405020304" pitchFamily="18" charset="0"/>
-                  </a:rPr>
-                  <a:t>(</a:t>
-                </a:r>
-                <a:r>
-                  <a:rPr lang="en-US" sz="1800" dirty="0" err="1">
-                    <a:solidFill>
-                      <a:srgbClr val="2A3648"/>
-                    </a:solidFill>
-                    <a:latin typeface="NewsGotT" pitchFamily="2" charset="0"/>
-                    <a:cs typeface="Times New Roman" panose="02020603050405020304" pitchFamily="18" charset="0"/>
-                  </a:rPr>
-                  <a:t>nenhum</a:t>
-                </a:r>
-                <a:r>
-                  <a:rPr lang="en-US" sz="1800" dirty="0">
-                    <a:solidFill>
-                      <a:srgbClr val="2A3648"/>
-                    </a:solidFill>
-                    <a:latin typeface="NewsGotT" pitchFamily="2" charset="0"/>
-                    <a:cs typeface="Times New Roman" panose="02020603050405020304" pitchFamily="18" charset="0"/>
-                  </a:rPr>
-                  <a:t> </a:t>
-                </a:r>
-                <a:r>
-                  <a:rPr lang="en-US" sz="1800" dirty="0" err="1">
-                    <a:solidFill>
-                      <a:srgbClr val="2A3648"/>
-                    </a:solidFill>
-                    <a:latin typeface="NewsGotT" pitchFamily="2" charset="0"/>
-                    <a:cs typeface="Times New Roman" panose="02020603050405020304" pitchFamily="18" charset="0"/>
-                  </a:rPr>
-                  <a:t>recuperado</a:t>
-                </a:r>
-                <a:r>
-                  <a:rPr lang="en-US" sz="1800" dirty="0">
-                    <a:solidFill>
-                      <a:srgbClr val="2A3648"/>
-                    </a:solidFill>
-                    <a:latin typeface="NewsGotT" pitchFamily="2" charset="0"/>
-                    <a:cs typeface="Times New Roman" panose="02020603050405020304" pitchFamily="18" charset="0"/>
-                  </a:rPr>
-                  <a:t>)</a:t>
-                </a:r>
-              </a:p>
-              <a:p>
-                <a:pPr marL="285750" indent="-285750" algn="just">
-                  <a:buFont typeface="Arial" panose="020B0604020202020204" pitchFamily="34" charset="0"/>
-                  <a:buChar char="•"/>
-                </a:pPr>
-                <a:r>
-                  <a:rPr lang="en-US" sz="1800" b="1" dirty="0">
-                    <a:solidFill>
-                      <a:srgbClr val="2A3648"/>
-                    </a:solidFill>
-                    <a:latin typeface="NewsGotT" pitchFamily="2" charset="0"/>
-                    <a:cs typeface="Times New Roman" panose="02020603050405020304" pitchFamily="18" charset="0"/>
-                  </a:rPr>
-                  <a:t>a = 0.002 </a:t>
-                </a:r>
-                <a:r>
-                  <a:rPr lang="en-US" sz="1800" dirty="0">
-                    <a:solidFill>
-                      <a:srgbClr val="2A3648"/>
-                    </a:solidFill>
-                    <a:latin typeface="NewsGotT" pitchFamily="2" charset="0"/>
-                    <a:cs typeface="Times New Roman" panose="02020603050405020304" pitchFamily="18" charset="0"/>
-                  </a:rPr>
-                  <a:t>(p/</a:t>
-                </a:r>
-                <a:r>
-                  <a:rPr lang="en-US" sz="1800" dirty="0" err="1">
-                    <a:solidFill>
-                      <a:srgbClr val="2A3648"/>
-                    </a:solidFill>
-                    <a:latin typeface="NewsGotT" pitchFamily="2" charset="0"/>
-                    <a:cs typeface="Times New Roman" panose="02020603050405020304" pitchFamily="18" charset="0"/>
-                  </a:rPr>
-                  <a:t>pessoa</a:t>
-                </a:r>
-                <a:r>
-                  <a:rPr lang="en-US" sz="1800" dirty="0">
-                    <a:solidFill>
-                      <a:srgbClr val="2A3648"/>
-                    </a:solidFill>
-                    <a:latin typeface="NewsGotT" pitchFamily="2" charset="0"/>
-                    <a:cs typeface="Times New Roman" panose="02020603050405020304" pitchFamily="18" charset="0"/>
-                  </a:rPr>
-                  <a:t> e p/</a:t>
-                </a:r>
-                <a:r>
-                  <a:rPr lang="en-US" sz="1800" dirty="0" err="1">
-                    <a:solidFill>
-                      <a:srgbClr val="2A3648"/>
-                    </a:solidFill>
-                    <a:latin typeface="NewsGotT" pitchFamily="2" charset="0"/>
-                    <a:cs typeface="Times New Roman" panose="02020603050405020304" pitchFamily="18" charset="0"/>
-                  </a:rPr>
-                  <a:t>semana</a:t>
-                </a:r>
-                <a:r>
-                  <a:rPr lang="en-US" sz="1800" dirty="0">
-                    <a:solidFill>
-                      <a:srgbClr val="2A3648"/>
-                    </a:solidFill>
-                    <a:latin typeface="NewsGotT" pitchFamily="2" charset="0"/>
-                    <a:cs typeface="Times New Roman" panose="02020603050405020304" pitchFamily="18" charset="0"/>
-                  </a:rPr>
-                  <a:t>) -&gt; taxa de </a:t>
-                </a:r>
-                <a:r>
-                  <a:rPr lang="en-US" sz="1800" dirty="0" err="1">
-                    <a:solidFill>
-                      <a:srgbClr val="2A3648"/>
-                    </a:solidFill>
-                    <a:latin typeface="NewsGotT" pitchFamily="2" charset="0"/>
-                    <a:cs typeface="Times New Roman" panose="02020603050405020304" pitchFamily="18" charset="0"/>
-                  </a:rPr>
-                  <a:t>infeção</a:t>
-                </a:r>
-                <a:endParaRPr lang="en-US" sz="1800" dirty="0">
-                  <a:solidFill>
-                    <a:srgbClr val="2A3648"/>
-                  </a:solidFill>
-                  <a:latin typeface="NewsGotT" pitchFamily="2" charset="0"/>
-                  <a:cs typeface="Times New Roman" panose="02020603050405020304" pitchFamily="18" charset="0"/>
-                </a:endParaRPr>
-              </a:p>
-              <a:p>
-                <a:pPr marL="285750" indent="-285750" algn="just">
-                  <a:buFont typeface="Arial" panose="020B0604020202020204" pitchFamily="34" charset="0"/>
-                  <a:buChar char="•"/>
-                </a:pPr>
-                <a:r>
-                  <a:rPr lang="en-US" sz="1800" b="1" dirty="0">
-                    <a:solidFill>
-                      <a:srgbClr val="2A3648"/>
-                    </a:solidFill>
-                    <a:latin typeface="NewsGotT" pitchFamily="2" charset="0"/>
-                    <a:cs typeface="Times New Roman" panose="02020603050405020304" pitchFamily="18" charset="0"/>
-                  </a:rPr>
-                  <a:t>r = 0.15    </a:t>
-                </a:r>
-                <a:r>
-                  <a:rPr lang="en-US" sz="1800" dirty="0">
-                    <a:solidFill>
-                      <a:srgbClr val="2A3648"/>
-                    </a:solidFill>
-                    <a:latin typeface="NewsGotT" pitchFamily="2" charset="0"/>
-                    <a:cs typeface="Times New Roman" panose="02020603050405020304" pitchFamily="18" charset="0"/>
-                  </a:rPr>
-                  <a:t>(p/ </a:t>
-                </a:r>
-                <a:r>
-                  <a:rPr lang="en-US" sz="1800" dirty="0" err="1">
-                    <a:solidFill>
-                      <a:srgbClr val="2A3648"/>
-                    </a:solidFill>
-                    <a:latin typeface="NewsGotT" pitchFamily="2" charset="0"/>
-                    <a:cs typeface="Times New Roman" panose="02020603050405020304" pitchFamily="18" charset="0"/>
-                  </a:rPr>
-                  <a:t>dia</a:t>
-                </a:r>
-                <a:r>
-                  <a:rPr lang="en-US" sz="1800" dirty="0">
-                    <a:solidFill>
-                      <a:srgbClr val="2A3648"/>
-                    </a:solidFill>
-                    <a:latin typeface="NewsGotT" pitchFamily="2" charset="0"/>
-                    <a:cs typeface="Times New Roman" panose="02020603050405020304" pitchFamily="18" charset="0"/>
-                  </a:rPr>
-                  <a:t>) -&gt; taxa de </a:t>
-                </a:r>
-                <a:r>
-                  <a:rPr lang="en-US" sz="1800" dirty="0" err="1">
-                    <a:solidFill>
-                      <a:srgbClr val="2A3648"/>
-                    </a:solidFill>
-                    <a:latin typeface="NewsGotT" pitchFamily="2" charset="0"/>
-                    <a:cs typeface="Times New Roman" panose="02020603050405020304" pitchFamily="18" charset="0"/>
-                  </a:rPr>
-                  <a:t>recuperação</a:t>
-                </a:r>
                 <a:endParaRPr lang="en-US" sz="1800" dirty="0">
                   <a:solidFill>
                     <a:srgbClr val="2A3648"/>
@@ -5560,46 +5159,6 @@
               </a:p>
               <a:p>
                 <a:pPr algn="just"/>
-                <a:endParaRPr lang="en-US" sz="1800" dirty="0">
-                  <a:solidFill>
-                    <a:srgbClr val="2A3648"/>
-                  </a:solidFill>
-                  <a:latin typeface="NewsGotT" pitchFamily="2" charset="0"/>
-                  <a:cs typeface="Times New Roman" panose="02020603050405020304" pitchFamily="18" charset="0"/>
-                </a:endParaRPr>
-              </a:p>
-              <a:p>
-                <a:pPr algn="just"/>
-                <a:r>
-                  <a:rPr lang="en-US" sz="2400" b="1" dirty="0" err="1">
-                    <a:solidFill>
-                      <a:srgbClr val="DD8D5C"/>
-                    </a:solidFill>
-                    <a:latin typeface="NewsGotT" pitchFamily="2" charset="0"/>
-                    <a:cs typeface="Times New Roman" panose="02020603050405020304" pitchFamily="18" charset="0"/>
-                  </a:rPr>
-                  <a:t>Métodos</a:t>
-                </a:r>
-                <a:r>
-                  <a:rPr lang="en-US" sz="2400" b="1" dirty="0">
-                    <a:solidFill>
-                      <a:srgbClr val="DD8D5C"/>
-                    </a:solidFill>
-                    <a:latin typeface="NewsGotT" pitchFamily="2" charset="0"/>
-                    <a:cs typeface="Times New Roman" panose="02020603050405020304" pitchFamily="18" charset="0"/>
-                  </a:rPr>
-                  <a:t> </a:t>
-                </a:r>
-                <a:r>
-                  <a:rPr lang="en-US" sz="2400" b="1" dirty="0" err="1">
-                    <a:solidFill>
-                      <a:srgbClr val="DD8D5C"/>
-                    </a:solidFill>
-                    <a:latin typeface="NewsGotT" pitchFamily="2" charset="0"/>
-                    <a:cs typeface="Times New Roman" panose="02020603050405020304" pitchFamily="18" charset="0"/>
-                  </a:rPr>
-                  <a:t>Utilizados</a:t>
-                </a:r>
                 <a:endParaRPr lang="en-US" sz="2400" b="1" dirty="0">
                   <a:solidFill>
                     <a:srgbClr val="DD8D5C"/>
@@ -5610,6 +5169,66 @@
               </a:p>
               <a:p>
                 <a:pPr algn="just"/>
+                <a:endParaRPr lang="en-US" sz="2400" b="1" dirty="0">
+                  <a:solidFill>
+                    <a:srgbClr val="DD8D5C"/>
+                  </a:solidFill>
+                  <a:latin typeface="NewsGotT" pitchFamily="2" charset="0"/>
+                  <a:cs typeface="Times New Roman" panose="02020603050405020304" pitchFamily="18" charset="0"/>
+                </a:endParaRPr>
+              </a:p>
+              <a:p>
+                <a:pPr algn="just"/>
+                <a:endParaRPr lang="en-US" sz="2400" b="1" dirty="0">
+                  <a:solidFill>
+                    <a:srgbClr val="DD8D5C"/>
+                  </a:solidFill>
+                  <a:latin typeface="NewsGotT" pitchFamily="2" charset="0"/>
+                  <a:cs typeface="Times New Roman" panose="02020603050405020304" pitchFamily="18" charset="0"/>
+                </a:endParaRPr>
+              </a:p>
+              <a:p>
+                <a:pPr algn="just"/>
+                <a:endParaRPr lang="en-US" sz="2400" b="1" dirty="0">
+                  <a:solidFill>
+                    <a:srgbClr val="DD8D5C"/>
+                  </a:solidFill>
+                  <a:latin typeface="NewsGotT" pitchFamily="2" charset="0"/>
+                  <a:cs typeface="Times New Roman" panose="02020603050405020304" pitchFamily="18" charset="0"/>
+                </a:endParaRPr>
+              </a:p>
+              <a:p>
+                <a:pPr algn="just"/>
+                <a:r>
+                  <a:rPr lang="en-US" sz="2400" b="1" dirty="0" err="1">
+                    <a:solidFill>
+                      <a:srgbClr val="DD8D5C"/>
+                    </a:solidFill>
+                    <a:latin typeface="NewsGotT" pitchFamily="2" charset="0"/>
+                    <a:cs typeface="Times New Roman" panose="02020603050405020304" pitchFamily="18" charset="0"/>
+                  </a:rPr>
+                  <a:t>Métodos</a:t>
+                </a:r>
+                <a:r>
+                  <a:rPr lang="en-US" sz="2400" b="1" dirty="0">
+                    <a:solidFill>
+                      <a:srgbClr val="DD8D5C"/>
+                    </a:solidFill>
+                    <a:latin typeface="NewsGotT" pitchFamily="2" charset="0"/>
+                    <a:cs typeface="Times New Roman" panose="02020603050405020304" pitchFamily="18" charset="0"/>
+                  </a:rPr>
+                  <a:t> </a:t>
+                </a:r>
+                <a:r>
+                  <a:rPr lang="en-US" sz="2400" b="1" dirty="0" err="1">
+                    <a:solidFill>
+                      <a:srgbClr val="DD8D5C"/>
+                    </a:solidFill>
+                    <a:latin typeface="NewsGotT" pitchFamily="2" charset="0"/>
+                    <a:cs typeface="Times New Roman" panose="02020603050405020304" pitchFamily="18" charset="0"/>
+                  </a:rPr>
+                  <a:t>Utilizados</a:t>
+                </a:r>
                 <a:endParaRPr lang="en-US" sz="1800" dirty="0">
                   <a:solidFill>
                     <a:srgbClr val="2A3648"/>
@@ -6712,7 +6331,7 @@
             </p:txBody>
           </p:sp>
         </mc:Choice>
-        <mc:Fallback xmlns="">
+        <mc:Fallback>
           <p:sp>
             <p:nvSpPr>
               <p:cNvPr id="15" name="CaixaDeTexto 14">
@@ -6729,7 +6348,7 @@
             </p:nvSpPr>
             <p:spPr>
               <a:xfrm>
-                <a:off x="27394" y="7994425"/>
+                <a:off x="10540" y="8047470"/>
                 <a:ext cx="7384901" cy="16619934"/>
               </a:xfrm>
               <a:prstGeom prst="rect">
@@ -6738,7 +6357,7 @@
               <a:blipFill>
                 <a:blip r:embed="rId2"/>
                 <a:stretch>
-                  <a:fillRect l="-1201" t="-305" r="-686"/>
+                  <a:fillRect l="-1201" r="-686"/>
                 </a:stretch>
               </a:blipFill>
             </p:spPr>
@@ -7095,7 +6714,7 @@
         </p:nvSpPr>
         <p:spPr>
           <a:xfrm>
-            <a:off x="16206" y="7513662"/>
+            <a:off x="14892" y="10548381"/>
             <a:ext cx="6761689" cy="499367"/>
           </a:xfrm>
           <a:prstGeom prst="rect">
@@ -7156,8 +6775,8 @@
         </p:nvSpPr>
         <p:spPr>
           <a:xfrm>
-            <a:off x="-1165" y="3607021"/>
-            <a:ext cx="7446084" cy="5632311"/>
+            <a:off x="-30448" y="3668581"/>
+            <a:ext cx="7446084" cy="5909310"/>
           </a:xfrm>
           <a:prstGeom prst="rect">
             <a:avLst/>
@@ -7557,16 +7176,6 @@
           </a:p>
           <a:p>
             <a:pPr algn="just"/>
-            <a:endParaRPr lang="en-US" sz="1800" dirty="0">
-              <a:solidFill>
-                <a:srgbClr val="2A3648"/>
-              </a:solidFill>
-              <a:latin typeface="NewsGotT" pitchFamily="2" charset="0"/>
-              <a:cs typeface="Times New Roman" panose="02020603050405020304" pitchFamily="18" charset="0"/>
-            </a:endParaRPr>
-          </a:p>
-          <a:p>
-            <a:pPr algn="just"/>
             <a:r>
               <a:rPr lang="en-US" sz="1800" dirty="0">
                 <a:solidFill>
@@ -8377,17 +7986,217 @@
             </a:r>
           </a:p>
           <a:p>
-            <a:pPr marL="285750" indent="-285750" algn="just">
-              <a:buFont typeface="Arial" panose="020B0604020202020204" pitchFamily="34" charset="0"/>
-              <a:buChar char="•"/>
-            </a:pPr>
-            <a:endParaRPr lang="en-US" sz="1800" dirty="0">
-              <a:solidFill>
-                <a:srgbClr val="2A3648"/>
-              </a:solidFill>
-              <a:latin typeface="NewsGotT" pitchFamily="2" charset="0"/>
-              <a:cs typeface="Times New Roman" panose="02020603050405020304" pitchFamily="18" charset="0"/>
-            </a:endParaRPr>
+            <a:pPr algn="just"/>
+            <a:r>
+              <a:rPr lang="en-US" sz="1800" dirty="0">
+                <a:solidFill>
+                  <a:srgbClr val="2A3648"/>
+                </a:solidFill>
+                <a:latin typeface="NewsGotT" pitchFamily="2" charset="0"/>
+                <a:cs typeface="Times New Roman" panose="02020603050405020304" pitchFamily="18" charset="0"/>
+              </a:rPr>
+              <a:t>Por </a:t>
+            </a:r>
+            <a:r>
+              <a:rPr lang="en-US" sz="1800" dirty="0" err="1">
+                <a:solidFill>
+                  <a:srgbClr val="2A3648"/>
+                </a:solidFill>
+                <a:latin typeface="NewsGotT" pitchFamily="2" charset="0"/>
+                <a:cs typeface="Times New Roman" panose="02020603050405020304" pitchFamily="18" charset="0"/>
+              </a:rPr>
+              <a:t>exemplo</a:t>
+            </a:r>
+            <a:r>
+              <a:rPr lang="en-US" sz="1800" dirty="0">
+                <a:solidFill>
+                  <a:srgbClr val="2A3648"/>
+                </a:solidFill>
+                <a:latin typeface="NewsGotT" pitchFamily="2" charset="0"/>
+                <a:cs typeface="Times New Roman" panose="02020603050405020304" pitchFamily="18" charset="0"/>
+              </a:rPr>
+              <a:t>, </a:t>
+            </a:r>
+            <a:r>
+              <a:rPr lang="en-US" sz="1800" dirty="0" err="1">
+                <a:solidFill>
+                  <a:srgbClr val="2A3648"/>
+                </a:solidFill>
+                <a:latin typeface="NewsGotT" pitchFamily="2" charset="0"/>
+                <a:cs typeface="Times New Roman" panose="02020603050405020304" pitchFamily="18" charset="0"/>
+              </a:rPr>
+              <a:t>durante</a:t>
+            </a:r>
+            <a:r>
+              <a:rPr lang="en-US" sz="1800" dirty="0">
+                <a:solidFill>
+                  <a:srgbClr val="2A3648"/>
+                </a:solidFill>
+                <a:latin typeface="NewsGotT" pitchFamily="2" charset="0"/>
+                <a:cs typeface="Times New Roman" panose="02020603050405020304" pitchFamily="18" charset="0"/>
+              </a:rPr>
+              <a:t> a pandemia COVID-19, o </a:t>
+            </a:r>
+            <a:r>
+              <a:rPr lang="en-US" sz="1800" dirty="0" err="1">
+                <a:solidFill>
+                  <a:srgbClr val="2A3648"/>
+                </a:solidFill>
+                <a:latin typeface="NewsGotT" pitchFamily="2" charset="0"/>
+                <a:cs typeface="Times New Roman" panose="02020603050405020304" pitchFamily="18" charset="0"/>
+              </a:rPr>
+              <a:t>modelo</a:t>
+            </a:r>
+            <a:r>
+              <a:rPr lang="en-US" sz="1800" dirty="0">
+                <a:solidFill>
+                  <a:srgbClr val="2A3648"/>
+                </a:solidFill>
+                <a:latin typeface="NewsGotT" pitchFamily="2" charset="0"/>
+                <a:cs typeface="Times New Roman" panose="02020603050405020304" pitchFamily="18" charset="0"/>
+              </a:rPr>
+              <a:t> SIR </a:t>
+            </a:r>
+            <a:r>
+              <a:rPr lang="en-US" sz="1800" dirty="0" err="1">
+                <a:solidFill>
+                  <a:srgbClr val="2A3648"/>
+                </a:solidFill>
+                <a:latin typeface="NewsGotT" pitchFamily="2" charset="0"/>
+                <a:cs typeface="Times New Roman" panose="02020603050405020304" pitchFamily="18" charset="0"/>
+              </a:rPr>
+              <a:t>foi</a:t>
+            </a:r>
+            <a:r>
+              <a:rPr lang="en-US" sz="1800" dirty="0">
+                <a:solidFill>
+                  <a:srgbClr val="2A3648"/>
+                </a:solidFill>
+                <a:latin typeface="NewsGotT" pitchFamily="2" charset="0"/>
+                <a:cs typeface="Times New Roman" panose="02020603050405020304" pitchFamily="18" charset="0"/>
+              </a:rPr>
+              <a:t> </a:t>
+            </a:r>
+            <a:r>
+              <a:rPr lang="en-US" sz="1800" dirty="0" err="1">
+                <a:solidFill>
+                  <a:srgbClr val="2A3648"/>
+                </a:solidFill>
+                <a:latin typeface="NewsGotT" pitchFamily="2" charset="0"/>
+                <a:cs typeface="Times New Roman" panose="02020603050405020304" pitchFamily="18" charset="0"/>
+              </a:rPr>
+              <a:t>amplamente</a:t>
+            </a:r>
+            <a:r>
+              <a:rPr lang="en-US" sz="1800" dirty="0">
+                <a:solidFill>
+                  <a:srgbClr val="2A3648"/>
+                </a:solidFill>
+                <a:latin typeface="NewsGotT" pitchFamily="2" charset="0"/>
+                <a:cs typeface="Times New Roman" panose="02020603050405020304" pitchFamily="18" charset="0"/>
+              </a:rPr>
+              <a:t> </a:t>
+            </a:r>
+            <a:r>
+              <a:rPr lang="en-US" sz="1800" dirty="0" err="1">
+                <a:solidFill>
+                  <a:srgbClr val="2A3648"/>
+                </a:solidFill>
+                <a:latin typeface="NewsGotT" pitchFamily="2" charset="0"/>
+                <a:cs typeface="Times New Roman" panose="02020603050405020304" pitchFamily="18" charset="0"/>
+              </a:rPr>
+              <a:t>utilizado</a:t>
+            </a:r>
+            <a:r>
+              <a:rPr lang="en-US" sz="1800" dirty="0">
+                <a:solidFill>
+                  <a:srgbClr val="2A3648"/>
+                </a:solidFill>
+                <a:latin typeface="NewsGotT" pitchFamily="2" charset="0"/>
+                <a:cs typeface="Times New Roman" panose="02020603050405020304" pitchFamily="18" charset="0"/>
+              </a:rPr>
+              <a:t> para </a:t>
+            </a:r>
+            <a:r>
+              <a:rPr lang="en-US" sz="1800" dirty="0" err="1">
+                <a:solidFill>
+                  <a:srgbClr val="2A3648"/>
+                </a:solidFill>
+                <a:latin typeface="NewsGotT" pitchFamily="2" charset="0"/>
+                <a:cs typeface="Times New Roman" panose="02020603050405020304" pitchFamily="18" charset="0"/>
+              </a:rPr>
+              <a:t>prever</a:t>
+            </a:r>
+            <a:r>
+              <a:rPr lang="en-US" sz="1800" dirty="0">
+                <a:solidFill>
+                  <a:srgbClr val="2A3648"/>
+                </a:solidFill>
+                <a:latin typeface="NewsGotT" pitchFamily="2" charset="0"/>
+                <a:cs typeface="Times New Roman" panose="02020603050405020304" pitchFamily="18" charset="0"/>
+              </a:rPr>
+              <a:t> a </a:t>
+            </a:r>
+            <a:r>
+              <a:rPr lang="en-US" sz="1800" dirty="0" err="1">
+                <a:solidFill>
+                  <a:srgbClr val="2A3648"/>
+                </a:solidFill>
+                <a:latin typeface="NewsGotT" pitchFamily="2" charset="0"/>
+                <a:cs typeface="Times New Roman" panose="02020603050405020304" pitchFamily="18" charset="0"/>
+              </a:rPr>
+              <a:t>evolução</a:t>
+            </a:r>
+            <a:r>
+              <a:rPr lang="en-US" sz="1800" dirty="0">
+                <a:solidFill>
+                  <a:srgbClr val="2A3648"/>
+                </a:solidFill>
+                <a:latin typeface="NewsGotT" pitchFamily="2" charset="0"/>
+                <a:cs typeface="Times New Roman" panose="02020603050405020304" pitchFamily="18" charset="0"/>
+              </a:rPr>
+              <a:t> de </a:t>
+            </a:r>
+            <a:r>
+              <a:rPr lang="en-US" sz="1800" dirty="0" err="1">
+                <a:solidFill>
+                  <a:srgbClr val="2A3648"/>
+                </a:solidFill>
+                <a:latin typeface="NewsGotT" pitchFamily="2" charset="0"/>
+                <a:cs typeface="Times New Roman" panose="02020603050405020304" pitchFamily="18" charset="0"/>
+              </a:rPr>
+              <a:t>infetados</a:t>
+            </a:r>
+            <a:r>
+              <a:rPr lang="en-US" sz="1800" dirty="0">
+                <a:solidFill>
+                  <a:srgbClr val="2A3648"/>
+                </a:solidFill>
+                <a:latin typeface="NewsGotT" pitchFamily="2" charset="0"/>
+                <a:cs typeface="Times New Roman" panose="02020603050405020304" pitchFamily="18" charset="0"/>
+              </a:rPr>
+              <a:t> </a:t>
+            </a:r>
+            <a:r>
+              <a:rPr lang="en-US" sz="1800" dirty="0" err="1">
+                <a:solidFill>
+                  <a:srgbClr val="2A3648"/>
+                </a:solidFill>
+                <a:latin typeface="NewsGotT" pitchFamily="2" charset="0"/>
+                <a:cs typeface="Times New Roman" panose="02020603050405020304" pitchFamily="18" charset="0"/>
+              </a:rPr>
+              <a:t>em</a:t>
+            </a:r>
+            <a:r>
+              <a:rPr lang="en-US" sz="1800" dirty="0">
+                <a:solidFill>
+                  <a:srgbClr val="2A3648"/>
+                </a:solidFill>
+                <a:latin typeface="NewsGotT" pitchFamily="2" charset="0"/>
+                <a:cs typeface="Times New Roman" panose="02020603050405020304" pitchFamily="18" charset="0"/>
+              </a:rPr>
+              <a:t> comunidades.</a:t>
+            </a:r>
           </a:p>
           <a:p>
             <a:pPr algn="just"/>
@@ -8828,6 +8637,19 @@
               <a:buChar char="•"/>
             </a:pPr>
             <a:endParaRPr lang="pt-PT" sz="1800" b="0" dirty="0">
+              <a:solidFill>
+                <a:srgbClr val="2A3648"/>
+              </a:solidFill>
+              <a:latin typeface="NewsGotT" pitchFamily="2" charset="0"/>
+              <a:cs typeface="Times New Roman" panose="02020603050405020304" pitchFamily="18" charset="0"/>
+            </a:endParaRPr>
+          </a:p>
+          <a:p>
+            <a:pPr marL="285750" indent="-285750" algn="just">
+              <a:buFont typeface="Arial" panose="020B0604020202020204" pitchFamily="34" charset="0"/>
+              <a:buChar char="•"/>
+            </a:pPr>
+            <a:endParaRPr lang="en-US" sz="1800" dirty="0">
               <a:solidFill>
                 <a:srgbClr val="2A3648"/>
               </a:solidFill>
@@ -10026,7 +9848,7 @@
         </p:nvCxnSpPr>
         <p:spPr bwMode="auto">
           <a:xfrm>
-            <a:off x="3099014" y="7763345"/>
+            <a:off x="3099014" y="10798064"/>
             <a:ext cx="4086493" cy="0"/>
           </a:xfrm>
           <a:prstGeom prst="line">
@@ -10441,7 +10263,7 @@
         </p:blipFill>
         <p:spPr>
           <a:xfrm>
-            <a:off x="2537850" y="14857946"/>
+            <a:off x="-13174" y="17051126"/>
             <a:ext cx="2032000" cy="1930400"/>
           </a:xfrm>
           <a:prstGeom prst="rect">
@@ -10465,7 +10287,7 @@
         </p:nvCxnSpPr>
         <p:spPr bwMode="auto">
           <a:xfrm>
-            <a:off x="2744701" y="18828716"/>
+            <a:off x="2744701" y="19066191"/>
             <a:ext cx="4440806" cy="0"/>
           </a:xfrm>
           <a:prstGeom prst="line">
@@ -10909,7 +10731,7 @@
         <p:spPr>
           <a:xfrm>
             <a:off x="7638374" y="18041840"/>
-            <a:ext cx="7371851" cy="4502836"/>
+            <a:ext cx="7371851" cy="5495735"/>
           </a:xfrm>
           <a:prstGeom prst="rect">
             <a:avLst/>
@@ -11139,23 +10961,18 @@
                 </a:solidFill>
                 <a:latin typeface="NewsGotT" pitchFamily="2" charset="0"/>
                 <a:cs typeface="Times New Roman" panose="02020603050405020304" pitchFamily="18" charset="0"/>
-                <a:hlinkClick r:id="rId7"/>
-              </a:rPr>
-              <a:t>https://doi.org/10.1098/rspa.</a:t>
-            </a:r>
-            <a:r>
-              <a:rPr lang="en-US" sz="1600">
-                <a:solidFill>
-                  <a:srgbClr val="2A3648"/>
-                </a:solidFill>
-                <a:latin typeface="NewsGotT" pitchFamily="2" charset="0"/>
-                <a:cs typeface="Times New Roman" panose="02020603050405020304" pitchFamily="18" charset="0"/>
-                <a:hlinkClick r:id="rId7"/>
-              </a:rPr>
-              <a:t>1927.0118</a:t>
-            </a:r>
-            <a:r>
-              <a:rPr lang="en-US" sz="1600">
+                <a:hlinkClick r:id="rId7">
+                  <a:extLst>
+                    <a:ext uri="{A12FA001-AC4F-418D-AE19-62706E023703}">
+                      <ahyp:hlinkClr xmlns:ahyp="http://schemas.microsoft.com/office/drawing/2018/hyperlinkcolor" val="tx"/>
+                    </a:ext>
+                  </a:extLst>
+                </a:hlinkClick>
+              </a:rPr>
+              <a:t>https://doi.org/10.1098/rspa.1927.0118</a:t>
+            </a:r>
+            <a:r>
+              <a:rPr lang="en-US" sz="1600" dirty="0">
                 <a:solidFill>
                   <a:srgbClr val="2A3648"/>
                 </a:solidFill>
@@ -11163,6 +10980,39 @@
                 <a:cs typeface="Times New Roman" panose="02020603050405020304" pitchFamily="18" charset="0"/>
               </a:rPr>
               <a:t> </a:t>
+            </a:r>
+          </a:p>
+          <a:p>
+            <a:pPr marL="285750" indent="-285750">
+              <a:buFont typeface="Arial" panose="020B0604020202020204" pitchFamily="34" charset="0"/>
+              <a:buChar char="•"/>
+            </a:pPr>
+            <a:r>
+              <a:rPr lang="en-US" sz="1600" dirty="0">
+                <a:solidFill>
+                  <a:srgbClr val="2A3648"/>
+                </a:solidFill>
+                <a:latin typeface="NewsGotT" pitchFamily="2" charset="0"/>
+                <a:cs typeface="Times New Roman" panose="02020603050405020304" pitchFamily="18" charset="0"/>
+              </a:rPr>
+              <a:t>Hethcote, H. W. (2000). The Mathematics of Infectious Diseases. ResearchGate, 42, 599–653. </a:t>
+            </a:r>
+            <a:r>
+              <a:rPr lang="en-US" sz="1600" dirty="0">
+                <a:solidFill>
+                  <a:srgbClr val="2A3648"/>
+                </a:solidFill>
+                <a:latin typeface="NewsGotT" pitchFamily="2" charset="0"/>
+                <a:cs typeface="Times New Roman" panose="02020603050405020304" pitchFamily="18" charset="0"/>
+                <a:hlinkClick r:id="rId8">
+                  <a:extLst>
+                    <a:ext uri="{A12FA001-AC4F-418D-AE19-62706E023703}">
+                      <ahyp:hlinkClr xmlns:ahyp="http://schemas.microsoft.com/office/drawing/2018/hyperlinkcolor" val="tx"/>
+                    </a:ext>
+                  </a:extLst>
+                </a:hlinkClick>
+              </a:rPr>
+              <a:t>https://www.researchgate.net/publication/216632172_The_Mathematics_of_Infectious_Diseases</a:t>
             </a:r>
             <a:endParaRPr lang="en-US" sz="1600" dirty="0">
               <a:solidFill>
@@ -11185,7 +11035,7 @@
                 <a:latin typeface="NewsGotT" pitchFamily="2" charset="0"/>
                 <a:cs typeface="Times New Roman" panose="02020603050405020304" pitchFamily="18" charset="0"/>
               </a:rPr>
-              <a:t>Hethcote, H. W. (2000). The Mathematics of Infectious Diseases. ResearchGate, 42, 599–653. https://</a:t>
+              <a:t>Yadav, R. S. (2020). Mathematical Modeling and Simulation of SIR Model for COVID-2019 Epidemic Outbreak: A Case Study of India. </a:t>
             </a:r>
             <a:r>
               <a:rPr lang="en-US" sz="1600" dirty="0" err="1">
@@ -11195,7 +11045,7 @@
                 <a:latin typeface="NewsGotT" pitchFamily="2" charset="0"/>
                 <a:cs typeface="Times New Roman" panose="02020603050405020304" pitchFamily="18" charset="0"/>
               </a:rPr>
-              <a:t>www.researchgate.net</a:t>
+              <a:t>MedRxiv</a:t>
             </a:r>
             <a:r>
               <a:rPr lang="en-US" sz="1600" dirty="0">
@@ -11205,11 +11055,54 @@
                 <a:latin typeface="NewsGotT" pitchFamily="2" charset="0"/>
                 <a:cs typeface="Times New Roman" panose="02020603050405020304" pitchFamily="18" charset="0"/>
               </a:rPr>
-              <a:t>/publication/216632172_The_Mathematics_of_Infectious_Diseases</a:t>
-            </a:r>
-          </a:p>
-          <a:p>
-            <a:endParaRPr lang="en-US" sz="1600" dirty="0">
+              <a:t> (Cold Spring Harbor Laboratory). </a:t>
+            </a:r>
+            <a:r>
+              <a:rPr lang="en-US" sz="1600" dirty="0">
+                <a:solidFill>
+                  <a:srgbClr val="2A3648"/>
+                </a:solidFill>
+                <a:latin typeface="NewsGotT" pitchFamily="2" charset="0"/>
+                <a:cs typeface="Times New Roman" panose="02020603050405020304" pitchFamily="18" charset="0"/>
+                <a:hlinkClick r:id="rId9">
+                  <a:extLst>
+                    <a:ext uri="{A12FA001-AC4F-418D-AE19-62706E023703}">
+                      <ahyp:hlinkClr xmlns:ahyp="http://schemas.microsoft.com/office/drawing/2018/hyperlinkcolor" val="tx"/>
+                    </a:ext>
+                  </a:extLst>
+                </a:hlinkClick>
+              </a:rPr>
+              <a:t>https://doi.org/10.1101/2020.05.15.20103077</a:t>
+            </a:r>
+            <a:r>
+              <a:rPr lang="en-US" sz="1600" dirty="0">
+                <a:solidFill>
+                  <a:srgbClr val="2A3648"/>
+                </a:solidFill>
+                <a:latin typeface="NewsGotT" pitchFamily="2" charset="0"/>
+                <a:cs typeface="Times New Roman" panose="02020603050405020304" pitchFamily="18" charset="0"/>
+              </a:rPr>
+              <a:t> Fig.1 [1]</a:t>
+            </a:r>
+          </a:p>
+          <a:p>
+            <a:r>
+              <a:rPr lang="en-US" sz="1600" dirty="0">
+                <a:solidFill>
+                  <a:srgbClr val="2A3648"/>
+                </a:solidFill>
+                <a:latin typeface="NewsGotT" pitchFamily="2" charset="0"/>
+                <a:cs typeface="Times New Roman" panose="02020603050405020304" pitchFamily="18" charset="0"/>
+              </a:rPr>
+              <a:t> ‌</a:t>
+            </a:r>
+          </a:p>
+          <a:p>
+            <a:pPr marL="285750" indent="-285750">
+              <a:buFont typeface="Arial" panose="020B0604020202020204" pitchFamily="34" charset="0"/>
+              <a:buChar char="•"/>
+            </a:pPr>
+            <a:endParaRPr lang="en-US" sz="1400" dirty="0">
               <a:solidFill>
                 <a:srgbClr val="2A3648"/>
               </a:solidFill>
@@ -11375,7 +11268,7 @@
           <p:nvPr/>
         </p:nvPicPr>
         <p:blipFill>
-          <a:blip r:embed="rId8"/>
+          <a:blip r:embed="rId10"/>
           <a:stretch>
             <a:fillRect/>
           </a:stretch>
@@ -11405,21 +11298,522 @@
           <p:nvPr/>
         </p:nvPicPr>
         <p:blipFill>
-          <a:blip r:embed="rId9"/>
+          <a:blip r:embed="rId11"/>
           <a:stretch>
             <a:fillRect/>
           </a:stretch>
         </p:blipFill>
         <p:spPr>
           <a:xfrm>
-            <a:off x="575700" y="13320073"/>
-            <a:ext cx="5956300" cy="1130300"/>
+            <a:off x="840817" y="15587092"/>
+            <a:ext cx="5142964" cy="975957"/>
           </a:xfrm>
           <a:prstGeom prst="rect">
             <a:avLst/>
           </a:prstGeom>
         </p:spPr>
       </p:pic>
+      <p:pic>
+        <p:nvPicPr>
+          <p:cNvPr id="8" name="Picture 7" descr="A graph showing the number of covid-19 infecting the coronavirus&#10;&#10;AI-generated content may be incorrect.">
+            <a:extLst>
+              <a:ext uri="{FF2B5EF4-FFF2-40B4-BE49-F238E27FC236}">
+                <a16:creationId xmlns:a16="http://schemas.microsoft.com/office/drawing/2014/main" id="{D18D719E-A748-DFF8-8EB5-55957FF70FAF}"/>
+              </a:ext>
+            </a:extLst>
+          </p:cNvPr>
+          <p:cNvPicPr>
+            <a:picLocks noChangeAspect="1"/>
+          </p:cNvPicPr>
+          <p:nvPr/>
+        </p:nvPicPr>
+        <p:blipFill>
+          <a:blip r:embed="rId12"/>
+          <a:stretch>
+            <a:fillRect/>
+          </a:stretch>
+        </p:blipFill>
+        <p:spPr>
+          <a:xfrm>
+            <a:off x="1387347" y="7557492"/>
+            <a:ext cx="4333005" cy="2836919"/>
+          </a:xfrm>
+          <a:prstGeom prst="rect">
+            <a:avLst/>
+          </a:prstGeom>
+        </p:spPr>
+      </p:pic>
+      <p:sp>
+        <p:nvSpPr>
+          <p:cNvPr id="9" name="TextBox 8">
+            <a:extLst>
+              <a:ext uri="{FF2B5EF4-FFF2-40B4-BE49-F238E27FC236}">
+                <a16:creationId xmlns:a16="http://schemas.microsoft.com/office/drawing/2014/main" id="{8BF14128-CBDD-DF46-C9F3-0A894A3ABD01}"/>
+              </a:ext>
+            </a:extLst>
+          </p:cNvPr>
+          <p:cNvSpPr txBox="1"/>
+          <p:nvPr/>
+        </p:nvSpPr>
+        <p:spPr>
+          <a:xfrm>
+            <a:off x="1997396" y="17042534"/>
+            <a:ext cx="5540810" cy="1938992"/>
+          </a:xfrm>
+          <a:prstGeom prst="rect">
+            <a:avLst/>
+          </a:prstGeom>
+          <a:noFill/>
+        </p:spPr>
+        <p:txBody>
+          <a:bodyPr wrap="square" rtlCol="0">
+            <a:spAutoFit/>
+          </a:bodyPr>
+          <a:lstStyle/>
+          <a:p>
+            <a:pPr algn="just"/>
+            <a:r>
+              <a:rPr lang="en-US" sz="2000" dirty="0" err="1">
+                <a:solidFill>
+                  <a:srgbClr val="2A3648"/>
+                </a:solidFill>
+                <a:latin typeface="NewsGotT" pitchFamily="2" charset="0"/>
+                <a:cs typeface="Times New Roman" panose="02020603050405020304" pitchFamily="18" charset="0"/>
+              </a:rPr>
+              <a:t>Condições</a:t>
+            </a:r>
+            <a:r>
+              <a:rPr lang="en-US" sz="2000" dirty="0">
+                <a:solidFill>
+                  <a:srgbClr val="2A3648"/>
+                </a:solidFill>
+                <a:latin typeface="NewsGotT" pitchFamily="2" charset="0"/>
+                <a:cs typeface="Times New Roman" panose="02020603050405020304" pitchFamily="18" charset="0"/>
+              </a:rPr>
+              <a:t> </a:t>
+            </a:r>
+            <a:r>
+              <a:rPr lang="en-US" sz="2000" dirty="0" err="1">
+                <a:solidFill>
+                  <a:srgbClr val="2A3648"/>
+                </a:solidFill>
+                <a:latin typeface="NewsGotT" pitchFamily="2" charset="0"/>
+                <a:cs typeface="Times New Roman" panose="02020603050405020304" pitchFamily="18" charset="0"/>
+              </a:rPr>
+              <a:t>Iniciais</a:t>
+            </a:r>
+            <a:r>
+              <a:rPr lang="en-US" sz="2000" dirty="0">
+                <a:solidFill>
+                  <a:srgbClr val="2A3648"/>
+                </a:solidFill>
+                <a:latin typeface="NewsGotT" pitchFamily="2" charset="0"/>
+                <a:cs typeface="Times New Roman" panose="02020603050405020304" pitchFamily="18" charset="0"/>
+              </a:rPr>
+              <a:t>: </a:t>
+            </a:r>
+          </a:p>
+          <a:p>
+            <a:pPr marL="285750" indent="-285750" algn="just">
+              <a:buFont typeface="Arial" panose="020B0604020202020204" pitchFamily="34" charset="0"/>
+              <a:buChar char="•"/>
+            </a:pPr>
+            <a:r>
+              <a:rPr lang="en-US" sz="2000" b="1" dirty="0">
+                <a:solidFill>
+                  <a:srgbClr val="2A3648"/>
+                </a:solidFill>
+                <a:latin typeface="NewsGotT" pitchFamily="2" charset="0"/>
+                <a:cs typeface="Times New Roman" panose="02020603050405020304" pitchFamily="18" charset="0"/>
+              </a:rPr>
+              <a:t>S(0) = 1000 </a:t>
+            </a:r>
+            <a:r>
+              <a:rPr lang="en-US" sz="2000" dirty="0">
+                <a:solidFill>
+                  <a:srgbClr val="2A3648"/>
+                </a:solidFill>
+                <a:latin typeface="NewsGotT" pitchFamily="2" charset="0"/>
+                <a:cs typeface="Times New Roman" panose="02020603050405020304" pitchFamily="18" charset="0"/>
+              </a:rPr>
+              <a:t>(</a:t>
+            </a:r>
+            <a:r>
+              <a:rPr lang="en-US" sz="2000" dirty="0" err="1">
+                <a:solidFill>
+                  <a:srgbClr val="2A3648"/>
+                </a:solidFill>
+                <a:latin typeface="NewsGotT" pitchFamily="2" charset="0"/>
+                <a:cs typeface="Times New Roman" panose="02020603050405020304" pitchFamily="18" charset="0"/>
+              </a:rPr>
+              <a:t>indivíduos</a:t>
+            </a:r>
+            <a:r>
+              <a:rPr lang="en-US" sz="2000" dirty="0">
+                <a:solidFill>
+                  <a:srgbClr val="2A3648"/>
+                </a:solidFill>
+                <a:latin typeface="NewsGotT" pitchFamily="2" charset="0"/>
+                <a:cs typeface="Times New Roman" panose="02020603050405020304" pitchFamily="18" charset="0"/>
+              </a:rPr>
+              <a:t> </a:t>
+            </a:r>
+            <a:r>
+              <a:rPr lang="en-US" sz="2000" dirty="0" err="1">
+                <a:solidFill>
+                  <a:srgbClr val="2A3648"/>
+                </a:solidFill>
+                <a:latin typeface="NewsGotT" pitchFamily="2" charset="0"/>
+                <a:cs typeface="Times New Roman" panose="02020603050405020304" pitchFamily="18" charset="0"/>
+              </a:rPr>
+              <a:t>susceptíveis</a:t>
+            </a:r>
+            <a:r>
+              <a:rPr lang="en-US" sz="2000" dirty="0">
+                <a:solidFill>
+                  <a:srgbClr val="2A3648"/>
+                </a:solidFill>
+                <a:latin typeface="NewsGotT" pitchFamily="2" charset="0"/>
+                <a:cs typeface="Times New Roman" panose="02020603050405020304" pitchFamily="18" charset="0"/>
+              </a:rPr>
+              <a:t>)</a:t>
+            </a:r>
+          </a:p>
+          <a:p>
+            <a:pPr marL="285750" indent="-285750" algn="just">
+              <a:buFont typeface="Arial" panose="020B0604020202020204" pitchFamily="34" charset="0"/>
+              <a:buChar char="•"/>
+            </a:pPr>
+            <a:r>
+              <a:rPr lang="en-US" sz="2000" b="1" dirty="0">
+                <a:solidFill>
+                  <a:srgbClr val="2A3648"/>
+                </a:solidFill>
+                <a:latin typeface="NewsGotT" pitchFamily="2" charset="0"/>
+                <a:cs typeface="Times New Roman" panose="02020603050405020304" pitchFamily="18" charset="0"/>
+              </a:rPr>
+              <a:t>I(0) = 1     </a:t>
+            </a:r>
+            <a:r>
+              <a:rPr lang="en-US" sz="2000" dirty="0">
+                <a:solidFill>
+                  <a:srgbClr val="2A3648"/>
+                </a:solidFill>
+                <a:latin typeface="NewsGotT" pitchFamily="2" charset="0"/>
+                <a:cs typeface="Times New Roman" panose="02020603050405020304" pitchFamily="18" charset="0"/>
+              </a:rPr>
+              <a:t>(</a:t>
+            </a:r>
+            <a:r>
+              <a:rPr lang="en-US" sz="2000" dirty="0" err="1">
+                <a:solidFill>
+                  <a:srgbClr val="2A3648"/>
+                </a:solidFill>
+                <a:latin typeface="NewsGotT" pitchFamily="2" charset="0"/>
+                <a:cs typeface="Times New Roman" panose="02020603050405020304" pitchFamily="18" charset="0"/>
+              </a:rPr>
+              <a:t>indivíduo</a:t>
+            </a:r>
+            <a:r>
+              <a:rPr lang="en-US" sz="2000" dirty="0">
+                <a:solidFill>
+                  <a:srgbClr val="2A3648"/>
+                </a:solidFill>
+                <a:latin typeface="NewsGotT" pitchFamily="2" charset="0"/>
+                <a:cs typeface="Times New Roman" panose="02020603050405020304" pitchFamily="18" charset="0"/>
+              </a:rPr>
+              <a:t> </a:t>
+            </a:r>
+            <a:r>
+              <a:rPr lang="en-US" sz="2000" dirty="0" err="1">
+                <a:solidFill>
+                  <a:srgbClr val="2A3648"/>
+                </a:solidFill>
+                <a:latin typeface="NewsGotT" pitchFamily="2" charset="0"/>
+                <a:cs typeface="Times New Roman" panose="02020603050405020304" pitchFamily="18" charset="0"/>
+              </a:rPr>
+              <a:t>infetado</a:t>
+            </a:r>
+            <a:r>
+              <a:rPr lang="en-US" sz="2000" dirty="0">
+                <a:solidFill>
+                  <a:srgbClr val="2A3648"/>
+                </a:solidFill>
+                <a:latin typeface="NewsGotT" pitchFamily="2" charset="0"/>
+                <a:cs typeface="Times New Roman" panose="02020603050405020304" pitchFamily="18" charset="0"/>
+              </a:rPr>
+              <a:t>)</a:t>
+            </a:r>
+          </a:p>
+          <a:p>
+            <a:pPr marL="285750" indent="-285750" algn="just">
+              <a:buFont typeface="Arial" panose="020B0604020202020204" pitchFamily="34" charset="0"/>
+              <a:buChar char="•"/>
+            </a:pPr>
+            <a:r>
+              <a:rPr lang="en-US" sz="2000" b="1" dirty="0">
+                <a:solidFill>
+                  <a:srgbClr val="2A3648"/>
+                </a:solidFill>
+                <a:latin typeface="NewsGotT" pitchFamily="2" charset="0"/>
+                <a:cs typeface="Times New Roman" panose="02020603050405020304" pitchFamily="18" charset="0"/>
+              </a:rPr>
+              <a:t>R(0) = 0    </a:t>
+            </a:r>
+            <a:r>
+              <a:rPr lang="en-US" sz="2000" dirty="0">
+                <a:solidFill>
+                  <a:srgbClr val="2A3648"/>
+                </a:solidFill>
+                <a:latin typeface="NewsGotT" pitchFamily="2" charset="0"/>
+                <a:cs typeface="Times New Roman" panose="02020603050405020304" pitchFamily="18" charset="0"/>
+              </a:rPr>
+              <a:t>(</a:t>
+            </a:r>
+            <a:r>
+              <a:rPr lang="en-US" sz="2000" dirty="0" err="1">
+                <a:solidFill>
+                  <a:srgbClr val="2A3648"/>
+                </a:solidFill>
+                <a:latin typeface="NewsGotT" pitchFamily="2" charset="0"/>
+                <a:cs typeface="Times New Roman" panose="02020603050405020304" pitchFamily="18" charset="0"/>
+              </a:rPr>
+              <a:t>nenhum</a:t>
+            </a:r>
+            <a:r>
+              <a:rPr lang="en-US" sz="2000" dirty="0">
+                <a:solidFill>
+                  <a:srgbClr val="2A3648"/>
+                </a:solidFill>
+                <a:latin typeface="NewsGotT" pitchFamily="2" charset="0"/>
+                <a:cs typeface="Times New Roman" panose="02020603050405020304" pitchFamily="18" charset="0"/>
+              </a:rPr>
+              <a:t> </a:t>
+            </a:r>
+            <a:r>
+              <a:rPr lang="en-US" sz="2000" dirty="0" err="1">
+                <a:solidFill>
+                  <a:srgbClr val="2A3648"/>
+                </a:solidFill>
+                <a:latin typeface="NewsGotT" pitchFamily="2" charset="0"/>
+                <a:cs typeface="Times New Roman" panose="02020603050405020304" pitchFamily="18" charset="0"/>
+              </a:rPr>
+              <a:t>recuperado</a:t>
+            </a:r>
+            <a:r>
+              <a:rPr lang="en-US" sz="2000" dirty="0">
+                <a:solidFill>
+                  <a:srgbClr val="2A3648"/>
+                </a:solidFill>
+                <a:latin typeface="NewsGotT" pitchFamily="2" charset="0"/>
+                <a:cs typeface="Times New Roman" panose="02020603050405020304" pitchFamily="18" charset="0"/>
+              </a:rPr>
+              <a:t>)</a:t>
+            </a:r>
+          </a:p>
+          <a:p>
+            <a:pPr marL="285750" indent="-285750" algn="just">
+              <a:buFont typeface="Arial" panose="020B0604020202020204" pitchFamily="34" charset="0"/>
+              <a:buChar char="•"/>
+            </a:pPr>
+            <a:r>
+              <a:rPr lang="en-US" sz="2000" b="1" dirty="0">
+                <a:solidFill>
+                  <a:srgbClr val="2A3648"/>
+                </a:solidFill>
+                <a:latin typeface="NewsGotT" pitchFamily="2" charset="0"/>
+                <a:cs typeface="Times New Roman" panose="02020603050405020304" pitchFamily="18" charset="0"/>
+              </a:rPr>
+              <a:t>a = 0.002 </a:t>
+            </a:r>
+            <a:r>
+              <a:rPr lang="en-US" sz="2000" dirty="0">
+                <a:solidFill>
+                  <a:srgbClr val="2A3648"/>
+                </a:solidFill>
+                <a:latin typeface="NewsGotT" pitchFamily="2" charset="0"/>
+                <a:cs typeface="Times New Roman" panose="02020603050405020304" pitchFamily="18" charset="0"/>
+              </a:rPr>
+              <a:t>(p/</a:t>
+            </a:r>
+            <a:r>
+              <a:rPr lang="en-US" sz="2000" dirty="0" err="1">
+                <a:solidFill>
+                  <a:srgbClr val="2A3648"/>
+                </a:solidFill>
+                <a:latin typeface="NewsGotT" pitchFamily="2" charset="0"/>
+                <a:cs typeface="Times New Roman" panose="02020603050405020304" pitchFamily="18" charset="0"/>
+              </a:rPr>
+              <a:t>pessoa</a:t>
+            </a:r>
+            <a:r>
+              <a:rPr lang="en-US" sz="2000" dirty="0">
+                <a:solidFill>
+                  <a:srgbClr val="2A3648"/>
+                </a:solidFill>
+                <a:latin typeface="NewsGotT" pitchFamily="2" charset="0"/>
+                <a:cs typeface="Times New Roman" panose="02020603050405020304" pitchFamily="18" charset="0"/>
+              </a:rPr>
+              <a:t> e p/</a:t>
+            </a:r>
+            <a:r>
+              <a:rPr lang="en-US" sz="2000" dirty="0" err="1">
+                <a:solidFill>
+                  <a:srgbClr val="2A3648"/>
+                </a:solidFill>
+                <a:latin typeface="NewsGotT" pitchFamily="2" charset="0"/>
+                <a:cs typeface="Times New Roman" panose="02020603050405020304" pitchFamily="18" charset="0"/>
+              </a:rPr>
+              <a:t>semana</a:t>
+            </a:r>
+            <a:r>
+              <a:rPr lang="en-US" sz="2000" dirty="0">
+                <a:solidFill>
+                  <a:srgbClr val="2A3648"/>
+                </a:solidFill>
+                <a:latin typeface="NewsGotT" pitchFamily="2" charset="0"/>
+                <a:cs typeface="Times New Roman" panose="02020603050405020304" pitchFamily="18" charset="0"/>
+              </a:rPr>
+              <a:t>) -&gt; taxa de </a:t>
+            </a:r>
+            <a:r>
+              <a:rPr lang="en-US" sz="2000" dirty="0" err="1">
+                <a:solidFill>
+                  <a:srgbClr val="2A3648"/>
+                </a:solidFill>
+                <a:latin typeface="NewsGotT" pitchFamily="2" charset="0"/>
+                <a:cs typeface="Times New Roman" panose="02020603050405020304" pitchFamily="18" charset="0"/>
+              </a:rPr>
+              <a:t>infeção</a:t>
+            </a:r>
+            <a:endParaRPr lang="en-US" sz="2000" dirty="0">
+              <a:solidFill>
+                <a:srgbClr val="2A3648"/>
+              </a:solidFill>
+              <a:latin typeface="NewsGotT" pitchFamily="2" charset="0"/>
+              <a:cs typeface="Times New Roman" panose="02020603050405020304" pitchFamily="18" charset="0"/>
+            </a:endParaRPr>
+          </a:p>
+          <a:p>
+            <a:pPr marL="285750" indent="-285750" algn="just">
+              <a:buFont typeface="Arial" panose="020B0604020202020204" pitchFamily="34" charset="0"/>
+              <a:buChar char="•"/>
+            </a:pPr>
+            <a:r>
+              <a:rPr lang="en-US" sz="2000" b="1" dirty="0">
+                <a:solidFill>
+                  <a:srgbClr val="2A3648"/>
+                </a:solidFill>
+                <a:latin typeface="NewsGotT" pitchFamily="2" charset="0"/>
+                <a:cs typeface="Times New Roman" panose="02020603050405020304" pitchFamily="18" charset="0"/>
+              </a:rPr>
+              <a:t>r = 0.15    </a:t>
+            </a:r>
+            <a:r>
+              <a:rPr lang="en-US" sz="2000" dirty="0">
+                <a:solidFill>
+                  <a:srgbClr val="2A3648"/>
+                </a:solidFill>
+                <a:latin typeface="NewsGotT" pitchFamily="2" charset="0"/>
+                <a:cs typeface="Times New Roman" panose="02020603050405020304" pitchFamily="18" charset="0"/>
+              </a:rPr>
+              <a:t>(p/ </a:t>
+            </a:r>
+            <a:r>
+              <a:rPr lang="en-US" sz="2000" dirty="0" err="1">
+                <a:solidFill>
+                  <a:srgbClr val="2A3648"/>
+                </a:solidFill>
+                <a:latin typeface="NewsGotT" pitchFamily="2" charset="0"/>
+                <a:cs typeface="Times New Roman" panose="02020603050405020304" pitchFamily="18" charset="0"/>
+              </a:rPr>
+              <a:t>dia</a:t>
+            </a:r>
+            <a:r>
+              <a:rPr lang="en-US" sz="2000" dirty="0">
+                <a:solidFill>
+                  <a:srgbClr val="2A3648"/>
+                </a:solidFill>
+                <a:latin typeface="NewsGotT" pitchFamily="2" charset="0"/>
+                <a:cs typeface="Times New Roman" panose="02020603050405020304" pitchFamily="18" charset="0"/>
+              </a:rPr>
+              <a:t>) -&gt; taxa de </a:t>
+            </a:r>
+            <a:r>
+              <a:rPr lang="en-US" sz="2000" dirty="0" err="1">
+                <a:solidFill>
+                  <a:srgbClr val="2A3648"/>
+                </a:solidFill>
+                <a:latin typeface="NewsGotT" pitchFamily="2" charset="0"/>
+                <a:cs typeface="Times New Roman" panose="02020603050405020304" pitchFamily="18" charset="0"/>
+              </a:rPr>
+              <a:t>recuperação</a:t>
+            </a:r>
+            <a:endParaRPr lang="pt-PT" dirty="0"/>
+          </a:p>
+        </p:txBody>
+      </p:sp>
+      <p:sp>
+        <p:nvSpPr>
+          <p:cNvPr id="12" name="TextBox 11">
+            <a:extLst>
+              <a:ext uri="{FF2B5EF4-FFF2-40B4-BE49-F238E27FC236}">
+                <a16:creationId xmlns:a16="http://schemas.microsoft.com/office/drawing/2014/main" id="{55880C50-855B-8BC4-AEB3-928CA1974D42}"/>
+              </a:ext>
+            </a:extLst>
+          </p:cNvPr>
+          <p:cNvSpPr txBox="1"/>
+          <p:nvPr/>
+        </p:nvSpPr>
+        <p:spPr>
+          <a:xfrm>
+            <a:off x="878031" y="10347088"/>
+            <a:ext cx="7874624" cy="307777"/>
+          </a:xfrm>
+          <a:prstGeom prst="rect">
+            <a:avLst/>
+          </a:prstGeom>
+          <a:noFill/>
+        </p:spPr>
+        <p:txBody>
+          <a:bodyPr wrap="square" rtlCol="0">
+            <a:spAutoFit/>
+          </a:bodyPr>
+          <a:lstStyle/>
+          <a:p>
+            <a:r>
+              <a:rPr lang="pt-PT" sz="1400" dirty="0">
+                <a:solidFill>
+                  <a:srgbClr val="2A3648"/>
+                </a:solidFill>
+                <a:latin typeface="NewsGotT" pitchFamily="2" charset="0"/>
+                <a:cs typeface="Times New Roman" panose="02020603050405020304" pitchFamily="18" charset="0"/>
+              </a:rPr>
+              <a:t>Fig.3-</a:t>
+            </a:r>
+            <a:r>
+              <a:rPr lang="en-US" sz="1400" dirty="0">
+                <a:solidFill>
+                  <a:srgbClr val="2A3648"/>
+                </a:solidFill>
+                <a:latin typeface="NewsGotT" pitchFamily="2" charset="0"/>
+                <a:cs typeface="Times New Roman" panose="02020603050405020304" pitchFamily="18" charset="0"/>
+              </a:rPr>
+              <a:t> SIR Model Simulation for COVID-2019 epidemic state of India from 7-May 2020 </a:t>
+            </a:r>
+            <a:r>
+              <a:rPr lang="pt-PT" sz="1400" dirty="0">
+                <a:solidFill>
+                  <a:srgbClr val="2A3648"/>
+                </a:solidFill>
+                <a:latin typeface="NewsGotT" pitchFamily="2" charset="0"/>
+                <a:cs typeface="Times New Roman" panose="02020603050405020304" pitchFamily="18" charset="0"/>
+              </a:rPr>
+              <a:t>[1]</a:t>
+            </a:r>
+          </a:p>
+        </p:txBody>
+      </p:sp>
     </p:spTree>
     <p:extLst>
       <p:ext uri="{BB962C8B-B14F-4D97-AF65-F5344CB8AC3E}">

</xml_diff>